<commit_message>
cambios muy necesarios en la estructura del negocio
</commit_message>
<xml_diff>
--- a/HT-6/Optica BAC-07-Estructura del negocio.pptx
+++ b/HT-6/Optica BAC-07-Estructura del negocio.pptx
@@ -213,7 +213,7 @@
           <a:p>
             <a:fld id="{C84E95E0-43A6-4D53-BDBE-E8A6E9BC4F1E}" type="datetimeFigureOut">
               <a:rPr lang="es-ES" smtClean="0"/>
-              <a:t>10/9/22</a:t>
+              <a:t>21/9/22</a:t>
             </a:fld>
             <a:endParaRPr lang="es-ES"/>
           </a:p>
@@ -1909,7 +1909,7 @@
           <p:nvPr>
             <p:extLst>
               <p:ext uri="{D42A27DB-BD31-4B8C-83A1-F6EECF244321}">
-                <p14:modId xmlns:p14="http://schemas.microsoft.com/office/powerpoint/2010/main" val="1022042101"/>
+                <p14:modId xmlns:p14="http://schemas.microsoft.com/office/powerpoint/2010/main" val="2902256706"/>
               </p:ext>
             </p:extLst>
           </p:nvPr>
@@ -2039,7 +2039,7 @@
                           <a:latin typeface="Arial" panose="020B0604020202020204" pitchFamily="34" charset="0"/>
                           <a:cs typeface="Arial" panose="020B0604020202020204" pitchFamily="34" charset="0"/>
                         </a:rPr>
-                        <a:t>Fecha: 10-9-22</a:t>
+                        <a:t>Fecha: 21-9-22</a:t>
                       </a:r>
                     </a:p>
                   </a:txBody>
@@ -2069,8 +2069,8 @@
         </p:nvSpPr>
         <p:spPr>
           <a:xfrm>
-            <a:off x="3936218" y="1540402"/>
-            <a:ext cx="3348805" cy="3186857"/>
+            <a:off x="4586897" y="788881"/>
+            <a:ext cx="3348805" cy="4509739"/>
           </a:xfrm>
           <a:prstGeom prst="rect">
             <a:avLst/>
@@ -2130,7 +2130,7 @@
         </p:nvSpPr>
         <p:spPr>
           <a:xfrm>
-            <a:off x="7873159" y="1540402"/>
+            <a:off x="8520203" y="883372"/>
             <a:ext cx="1089901" cy="1888596"/>
           </a:xfrm>
           <a:prstGeom prst="rect">
@@ -2202,7 +2202,7 @@
         </p:nvCxnSpPr>
         <p:spPr>
           <a:xfrm>
-            <a:off x="7287365" y="1784662"/>
+            <a:off x="7934409" y="1127632"/>
             <a:ext cx="589995" cy="0"/>
           </a:xfrm>
           <a:prstGeom prst="line">
@@ -2250,7 +2250,7 @@
         </p:nvSpPr>
         <p:spPr>
           <a:xfrm>
-            <a:off x="3470183" y="1930422"/>
+            <a:off x="4129362" y="1725915"/>
             <a:ext cx="372218" cy="276999"/>
           </a:xfrm>
           <a:prstGeom prst="rect">
@@ -2292,7 +2292,7 @@
         </p:nvSpPr>
         <p:spPr>
           <a:xfrm>
-            <a:off x="7397378" y="1507663"/>
+            <a:off x="8044422" y="850633"/>
             <a:ext cx="380232" cy="276999"/>
           </a:xfrm>
           <a:prstGeom prst="rect">
@@ -2334,7 +2334,7 @@
         </p:nvSpPr>
         <p:spPr>
           <a:xfrm>
-            <a:off x="7397378" y="2969811"/>
+            <a:off x="8044422" y="2312781"/>
             <a:ext cx="397865" cy="276999"/>
           </a:xfrm>
           <a:prstGeom prst="rect">
@@ -2376,7 +2376,7 @@
         </p:nvCxnSpPr>
         <p:spPr>
           <a:xfrm>
-            <a:off x="7289226" y="3234656"/>
+            <a:off x="7936270" y="2577626"/>
             <a:ext cx="588134" cy="2"/>
           </a:xfrm>
           <a:prstGeom prst="line">
@@ -2424,7 +2424,7 @@
         </p:nvSpPr>
         <p:spPr>
           <a:xfrm>
-            <a:off x="2308343" y="1540402"/>
+            <a:off x="2967522" y="1335895"/>
             <a:ext cx="1090200" cy="1279984"/>
           </a:xfrm>
           <a:prstGeom prst="rect">
@@ -2494,7 +2494,7 @@
         </p:nvSpPr>
         <p:spPr>
           <a:xfrm>
-            <a:off x="2286802" y="3474654"/>
+            <a:off x="2945981" y="3270147"/>
             <a:ext cx="1090200" cy="1252605"/>
           </a:xfrm>
           <a:prstGeom prst="rect">
@@ -2560,7 +2560,7 @@
         </p:nvCxnSpPr>
         <p:spPr>
           <a:xfrm>
-            <a:off x="3398543" y="2180394"/>
+            <a:off x="4057722" y="1975887"/>
             <a:ext cx="526190" cy="0"/>
           </a:xfrm>
           <a:prstGeom prst="line">
@@ -2608,7 +2608,7 @@
         </p:nvSpPr>
         <p:spPr>
           <a:xfrm>
-            <a:off x="3453988" y="3823957"/>
+            <a:off x="4113167" y="3619450"/>
             <a:ext cx="372218" cy="276999"/>
           </a:xfrm>
           <a:prstGeom prst="rect">
@@ -2653,7 +2653,7 @@
         </p:nvCxnSpPr>
         <p:spPr>
           <a:xfrm>
-            <a:off x="3377002" y="4100957"/>
+            <a:off x="4036181" y="3896450"/>
             <a:ext cx="526190" cy="0"/>
           </a:xfrm>
           <a:prstGeom prst="line">
@@ -2701,8 +2701,8 @@
         </p:nvSpPr>
         <p:spPr>
           <a:xfrm>
-            <a:off x="7877974" y="4108038"/>
-            <a:ext cx="1089901" cy="653449"/>
+            <a:off x="8515987" y="4303438"/>
+            <a:ext cx="1089901" cy="809521"/>
           </a:xfrm>
           <a:prstGeom prst="rect">
             <a:avLst/>
@@ -2767,13 +2767,13 @@
             </a:extLst>
           </p:cNvPr>
           <p:cNvCxnSpPr>
-            <a:endCxn id="52" idx="1"/>
+            <a:cxnSpLocks/>
           </p:cNvCxnSpPr>
           <p:nvPr/>
         </p:nvCxnSpPr>
         <p:spPr>
           <a:xfrm>
-            <a:off x="7287979" y="4434763"/>
+            <a:off x="7924805" y="4576763"/>
             <a:ext cx="589995" cy="0"/>
           </a:xfrm>
           <a:prstGeom prst="line">
@@ -2821,7 +2821,7 @@
         </p:nvSpPr>
         <p:spPr>
           <a:xfrm>
-            <a:off x="7388975" y="4157763"/>
+            <a:off x="8026423" y="4342048"/>
             <a:ext cx="380232" cy="276999"/>
           </a:xfrm>
           <a:prstGeom prst="rect">
@@ -2898,7 +2898,7 @@
         </p:nvSpPr>
         <p:spPr>
           <a:xfrm>
-            <a:off x="5067376" y="3474654"/>
+            <a:off x="5718055" y="2723134"/>
             <a:ext cx="1090200" cy="832429"/>
           </a:xfrm>
           <a:prstGeom prst="rect">
@@ -2961,7 +2961,7 @@
         </p:nvSpPr>
         <p:spPr>
           <a:xfrm>
-            <a:off x="4040926" y="1658991"/>
+            <a:off x="4691605" y="907471"/>
             <a:ext cx="777777" cy="338554"/>
           </a:xfrm>
           <a:prstGeom prst="rect">
@@ -3005,7 +3005,7 @@
         </p:nvCxnSpPr>
         <p:spPr>
           <a:xfrm>
-            <a:off x="7276465" y="2111385"/>
+            <a:off x="7923509" y="1454355"/>
             <a:ext cx="589995" cy="0"/>
           </a:xfrm>
           <a:prstGeom prst="line">
@@ -3053,7 +3053,7 @@
         </p:nvSpPr>
         <p:spPr>
           <a:xfrm>
-            <a:off x="7386478" y="1834386"/>
+            <a:off x="8033522" y="1177356"/>
             <a:ext cx="380232" cy="276999"/>
           </a:xfrm>
           <a:prstGeom prst="rect">
@@ -3097,7 +3097,7 @@
         </p:nvCxnSpPr>
         <p:spPr>
           <a:xfrm>
-            <a:off x="7281370" y="2493628"/>
+            <a:off x="7928414" y="1836598"/>
             <a:ext cx="589995" cy="0"/>
           </a:xfrm>
           <a:prstGeom prst="line">
@@ -3145,7 +3145,7 @@
         </p:nvSpPr>
         <p:spPr>
           <a:xfrm>
-            <a:off x="7391383" y="2216629"/>
+            <a:off x="8038427" y="1559599"/>
             <a:ext cx="380232" cy="276999"/>
           </a:xfrm>
           <a:prstGeom prst="rect">
@@ -3189,7 +3189,7 @@
         </p:nvCxnSpPr>
         <p:spPr>
           <a:xfrm>
-            <a:off x="7278948" y="2842000"/>
+            <a:off x="7925992" y="2184970"/>
             <a:ext cx="589995" cy="0"/>
           </a:xfrm>
           <a:prstGeom prst="line">
@@ -3237,7 +3237,7 @@
         </p:nvSpPr>
         <p:spPr>
           <a:xfrm>
-            <a:off x="7388975" y="2610929"/>
+            <a:off x="8036019" y="1953899"/>
             <a:ext cx="380232" cy="276999"/>
           </a:xfrm>
           <a:prstGeom prst="rect">
@@ -3279,7 +3279,7 @@
         </p:nvSpPr>
         <p:spPr>
           <a:xfrm>
-            <a:off x="5065520" y="2151763"/>
+            <a:off x="5716199" y="1400243"/>
             <a:ext cx="1090200" cy="832429"/>
           </a:xfrm>
           <a:prstGeom prst="rect">
@@ -3346,7 +3346,7 @@
         </p:nvCxnSpPr>
         <p:spPr>
           <a:xfrm>
-            <a:off x="5610620" y="2984192"/>
+            <a:off x="6261299" y="2232672"/>
             <a:ext cx="1856" cy="490462"/>
           </a:xfrm>
           <a:prstGeom prst="line">
@@ -3394,7 +3394,7 @@
         </p:nvSpPr>
         <p:spPr>
           <a:xfrm>
-            <a:off x="5610620" y="3090673"/>
+            <a:off x="6261299" y="2339153"/>
             <a:ext cx="380232" cy="276999"/>
           </a:xfrm>
           <a:prstGeom prst="rect">
@@ -3422,6 +3422,526 @@
           </a:p>
         </p:txBody>
       </p:sp>
+      <p:sp>
+        <p:nvSpPr>
+          <p:cNvPr id="4" name="48 Rectángulo">
+            <a:extLst>
+              <a:ext uri="{FF2B5EF4-FFF2-40B4-BE49-F238E27FC236}">
+                <a16:creationId xmlns:a16="http://schemas.microsoft.com/office/drawing/2014/main" id="{6C868B81-5DC8-2F99-BCF4-A108F56D3609}"/>
+              </a:ext>
+            </a:extLst>
+          </p:cNvPr>
+          <p:cNvSpPr/>
+          <p:nvPr/>
+        </p:nvSpPr>
+        <p:spPr>
+          <a:xfrm>
+            <a:off x="8512397" y="2925904"/>
+            <a:ext cx="1089901" cy="1223598"/>
+          </a:xfrm>
+          <a:prstGeom prst="rect">
+            <a:avLst/>
+          </a:prstGeom>
+          <a:solidFill>
+            <a:schemeClr val="bg1"/>
+          </a:solidFill>
+          <a:ln w="12700">
+            <a:solidFill>
+              <a:schemeClr val="tx1"/>
+            </a:solidFill>
+          </a:ln>
+        </p:spPr>
+        <p:style>
+          <a:lnRef idx="2">
+            <a:schemeClr val="accent1">
+              <a:shade val="50000"/>
+            </a:schemeClr>
+          </a:lnRef>
+          <a:fillRef idx="1">
+            <a:schemeClr val="accent1"/>
+          </a:fillRef>
+          <a:effectRef idx="0">
+            <a:schemeClr val="accent1"/>
+          </a:effectRef>
+          <a:fontRef idx="minor">
+            <a:schemeClr val="lt1"/>
+          </a:fontRef>
+        </p:style>
+        <p:txBody>
+          <a:bodyPr vert="horz" rtlCol="0" anchor="ctr"/>
+          <a:lstStyle/>
+          <a:p>
+            <a:pPr algn="ctr"/>
+            <a:r>
+              <a:rPr lang="es-MX" sz="1400" dirty="0">
+                <a:solidFill>
+                  <a:schemeClr val="tx1"/>
+                </a:solidFill>
+                <a:latin typeface="Arial" panose="020B0604020202020204" pitchFamily="34" charset="0"/>
+                <a:cs typeface="Arial" panose="020B0604020202020204" pitchFamily="34" charset="0"/>
+              </a:rPr>
+              <a:t>Cliente Online</a:t>
+            </a:r>
+            <a:endParaRPr lang="es-CO" sz="1400" dirty="0">
+              <a:solidFill>
+                <a:schemeClr val="tx1"/>
+              </a:solidFill>
+              <a:latin typeface="Arial" panose="020B0604020202020204" pitchFamily="34" charset="0"/>
+              <a:cs typeface="Arial" panose="020B0604020202020204" pitchFamily="34" charset="0"/>
+            </a:endParaRPr>
+          </a:p>
+        </p:txBody>
+      </p:sp>
+      <p:cxnSp>
+        <p:nvCxnSpPr>
+          <p:cNvPr id="6" name="10 Conector recto">
+            <a:extLst>
+              <a:ext uri="{FF2B5EF4-FFF2-40B4-BE49-F238E27FC236}">
+                <a16:creationId xmlns:a16="http://schemas.microsoft.com/office/drawing/2014/main" id="{049F218D-3AFC-460F-4470-551EAFA65AB5}"/>
+              </a:ext>
+            </a:extLst>
+          </p:cNvPr>
+          <p:cNvCxnSpPr>
+            <a:cxnSpLocks/>
+          </p:cNvCxnSpPr>
+          <p:nvPr/>
+        </p:nvCxnSpPr>
+        <p:spPr>
+          <a:xfrm>
+            <a:off x="7918271" y="3126898"/>
+            <a:ext cx="589995" cy="0"/>
+          </a:xfrm>
+          <a:prstGeom prst="line">
+            <a:avLst/>
+          </a:prstGeom>
+          <a:solidFill>
+            <a:schemeClr val="bg1"/>
+          </a:solidFill>
+          <a:ln w="12700" cap="flat">
+            <a:solidFill>
+              <a:schemeClr val="tx1"/>
+            </a:solidFill>
+            <a:headEnd type="oval" w="sm" len="sm"/>
+            <a:tailEnd type="oval" w="sm" len="sm"/>
+          </a:ln>
+        </p:spPr>
+        <p:style>
+          <a:lnRef idx="2">
+            <a:schemeClr val="accent1">
+              <a:shade val="50000"/>
+            </a:schemeClr>
+          </a:lnRef>
+          <a:fillRef idx="1">
+            <a:schemeClr val="accent1"/>
+          </a:fillRef>
+          <a:effectRef idx="0">
+            <a:schemeClr val="accent1"/>
+          </a:effectRef>
+          <a:fontRef idx="minor">
+            <a:schemeClr val="lt1"/>
+          </a:fontRef>
+        </p:style>
+      </p:cxnSp>
+      <p:sp>
+        <p:nvSpPr>
+          <p:cNvPr id="10" name="12 CuadroTexto">
+            <a:extLst>
+              <a:ext uri="{FF2B5EF4-FFF2-40B4-BE49-F238E27FC236}">
+                <a16:creationId xmlns:a16="http://schemas.microsoft.com/office/drawing/2014/main" id="{5EABF0A0-5472-D7F2-0D8F-2D05640C8CE5}"/>
+              </a:ext>
+            </a:extLst>
+          </p:cNvPr>
+          <p:cNvSpPr txBox="1"/>
+          <p:nvPr/>
+        </p:nvSpPr>
+        <p:spPr>
+          <a:xfrm>
+            <a:off x="8028284" y="2849899"/>
+            <a:ext cx="380232" cy="276999"/>
+          </a:xfrm>
+          <a:prstGeom prst="rect">
+            <a:avLst/>
+          </a:prstGeom>
+          <a:noFill/>
+        </p:spPr>
+        <p:txBody>
+          <a:bodyPr wrap="none" rtlCol="0">
+            <a:spAutoFit/>
+          </a:bodyPr>
+          <a:lstStyle/>
+          <a:p>
+            <a:r>
+              <a:rPr lang="es-MX" sz="1200" dirty="0">
+                <a:latin typeface="Arial" panose="020B0604020202020204" pitchFamily="34" charset="0"/>
+                <a:cs typeface="Arial" panose="020B0604020202020204" pitchFamily="34" charset="0"/>
+              </a:rPr>
+              <a:t>R5</a:t>
+            </a:r>
+            <a:endParaRPr lang="es-CO" sz="1200" dirty="0">
+              <a:latin typeface="Arial" panose="020B0604020202020204" pitchFamily="34" charset="0"/>
+              <a:cs typeface="Arial" panose="020B0604020202020204" pitchFamily="34" charset="0"/>
+            </a:endParaRPr>
+          </a:p>
+        </p:txBody>
+      </p:sp>
+      <p:cxnSp>
+        <p:nvCxnSpPr>
+          <p:cNvPr id="11" name="10 Conector recto">
+            <a:extLst>
+              <a:ext uri="{FF2B5EF4-FFF2-40B4-BE49-F238E27FC236}">
+                <a16:creationId xmlns:a16="http://schemas.microsoft.com/office/drawing/2014/main" id="{202F2CEC-CAB3-46EE-5078-31F2389952F8}"/>
+              </a:ext>
+            </a:extLst>
+          </p:cNvPr>
+          <p:cNvCxnSpPr>
+            <a:cxnSpLocks/>
+          </p:cNvCxnSpPr>
+          <p:nvPr/>
+        </p:nvCxnSpPr>
+        <p:spPr>
+          <a:xfrm>
+            <a:off x="7918494" y="3432530"/>
+            <a:ext cx="589995" cy="0"/>
+          </a:xfrm>
+          <a:prstGeom prst="line">
+            <a:avLst/>
+          </a:prstGeom>
+          <a:solidFill>
+            <a:schemeClr val="bg1"/>
+          </a:solidFill>
+          <a:ln w="12700" cap="flat">
+            <a:solidFill>
+              <a:schemeClr val="tx1"/>
+            </a:solidFill>
+            <a:headEnd type="oval" w="sm" len="sm"/>
+            <a:tailEnd type="oval" w="sm" len="sm"/>
+          </a:ln>
+        </p:spPr>
+        <p:style>
+          <a:lnRef idx="2">
+            <a:schemeClr val="accent1">
+              <a:shade val="50000"/>
+            </a:schemeClr>
+          </a:lnRef>
+          <a:fillRef idx="1">
+            <a:schemeClr val="accent1"/>
+          </a:fillRef>
+          <a:effectRef idx="0">
+            <a:schemeClr val="accent1"/>
+          </a:effectRef>
+          <a:fontRef idx="minor">
+            <a:schemeClr val="lt1"/>
+          </a:fontRef>
+        </p:style>
+      </p:cxnSp>
+      <p:sp>
+        <p:nvSpPr>
+          <p:cNvPr id="12" name="12 CuadroTexto">
+            <a:extLst>
+              <a:ext uri="{FF2B5EF4-FFF2-40B4-BE49-F238E27FC236}">
+                <a16:creationId xmlns:a16="http://schemas.microsoft.com/office/drawing/2014/main" id="{85A8896B-DC45-56F1-2175-8BE86633DA0F}"/>
+              </a:ext>
+            </a:extLst>
+          </p:cNvPr>
+          <p:cNvSpPr txBox="1"/>
+          <p:nvPr/>
+        </p:nvSpPr>
+        <p:spPr>
+          <a:xfrm>
+            <a:off x="8028507" y="3155531"/>
+            <a:ext cx="380232" cy="276999"/>
+          </a:xfrm>
+          <a:prstGeom prst="rect">
+            <a:avLst/>
+          </a:prstGeom>
+          <a:noFill/>
+        </p:spPr>
+        <p:txBody>
+          <a:bodyPr wrap="none" rtlCol="0">
+            <a:spAutoFit/>
+          </a:bodyPr>
+          <a:lstStyle/>
+          <a:p>
+            <a:r>
+              <a:rPr lang="es-MX" sz="1200" dirty="0">
+                <a:latin typeface="Arial" panose="020B0604020202020204" pitchFamily="34" charset="0"/>
+                <a:cs typeface="Arial" panose="020B0604020202020204" pitchFamily="34" charset="0"/>
+              </a:rPr>
+              <a:t>R6</a:t>
+            </a:r>
+            <a:endParaRPr lang="es-CO" sz="1200" dirty="0">
+              <a:latin typeface="Arial" panose="020B0604020202020204" pitchFamily="34" charset="0"/>
+              <a:cs typeface="Arial" panose="020B0604020202020204" pitchFamily="34" charset="0"/>
+            </a:endParaRPr>
+          </a:p>
+        </p:txBody>
+      </p:sp>
+      <p:cxnSp>
+        <p:nvCxnSpPr>
+          <p:cNvPr id="14" name="10 Conector recto">
+            <a:extLst>
+              <a:ext uri="{FF2B5EF4-FFF2-40B4-BE49-F238E27FC236}">
+                <a16:creationId xmlns:a16="http://schemas.microsoft.com/office/drawing/2014/main" id="{6F6CAD87-4FC1-C481-8391-7C08A80D3A4D}"/>
+              </a:ext>
+            </a:extLst>
+          </p:cNvPr>
+          <p:cNvCxnSpPr>
+            <a:cxnSpLocks/>
+          </p:cNvCxnSpPr>
+          <p:nvPr/>
+        </p:nvCxnSpPr>
+        <p:spPr>
+          <a:xfrm>
+            <a:off x="7922209" y="3734415"/>
+            <a:ext cx="589995" cy="0"/>
+          </a:xfrm>
+          <a:prstGeom prst="line">
+            <a:avLst/>
+          </a:prstGeom>
+          <a:solidFill>
+            <a:schemeClr val="bg1"/>
+          </a:solidFill>
+          <a:ln w="12700" cap="flat">
+            <a:solidFill>
+              <a:schemeClr val="tx1"/>
+            </a:solidFill>
+            <a:headEnd type="oval" w="sm" len="sm"/>
+            <a:tailEnd type="oval" w="sm" len="sm"/>
+          </a:ln>
+        </p:spPr>
+        <p:style>
+          <a:lnRef idx="2">
+            <a:schemeClr val="accent1">
+              <a:shade val="50000"/>
+            </a:schemeClr>
+          </a:lnRef>
+          <a:fillRef idx="1">
+            <a:schemeClr val="accent1"/>
+          </a:fillRef>
+          <a:effectRef idx="0">
+            <a:schemeClr val="accent1"/>
+          </a:effectRef>
+          <a:fontRef idx="minor">
+            <a:schemeClr val="lt1"/>
+          </a:fontRef>
+        </p:style>
+      </p:cxnSp>
+      <p:sp>
+        <p:nvSpPr>
+          <p:cNvPr id="15" name="12 CuadroTexto">
+            <a:extLst>
+              <a:ext uri="{FF2B5EF4-FFF2-40B4-BE49-F238E27FC236}">
+                <a16:creationId xmlns:a16="http://schemas.microsoft.com/office/drawing/2014/main" id="{B25EFAEB-3397-04E8-D56A-233540095861}"/>
+              </a:ext>
+            </a:extLst>
+          </p:cNvPr>
+          <p:cNvSpPr txBox="1"/>
+          <p:nvPr/>
+        </p:nvSpPr>
+        <p:spPr>
+          <a:xfrm>
+            <a:off x="8032236" y="3503344"/>
+            <a:ext cx="380232" cy="276999"/>
+          </a:xfrm>
+          <a:prstGeom prst="rect">
+            <a:avLst/>
+          </a:prstGeom>
+          <a:noFill/>
+        </p:spPr>
+        <p:txBody>
+          <a:bodyPr wrap="none" rtlCol="0">
+            <a:spAutoFit/>
+          </a:bodyPr>
+          <a:lstStyle/>
+          <a:p>
+            <a:r>
+              <a:rPr lang="es-MX" sz="1200" dirty="0">
+                <a:latin typeface="Arial" panose="020B0604020202020204" pitchFamily="34" charset="0"/>
+                <a:cs typeface="Arial" panose="020B0604020202020204" pitchFamily="34" charset="0"/>
+              </a:rPr>
+              <a:t>D3</a:t>
+            </a:r>
+          </a:p>
+        </p:txBody>
+      </p:sp>
+      <p:sp>
+        <p:nvSpPr>
+          <p:cNvPr id="16" name="13 CuadroTexto">
+            <a:extLst>
+              <a:ext uri="{FF2B5EF4-FFF2-40B4-BE49-F238E27FC236}">
+                <a16:creationId xmlns:a16="http://schemas.microsoft.com/office/drawing/2014/main" id="{F300817B-0474-FC64-D84F-CC9CA6CD4E08}"/>
+              </a:ext>
+            </a:extLst>
+          </p:cNvPr>
+          <p:cNvSpPr txBox="1"/>
+          <p:nvPr/>
+        </p:nvSpPr>
+        <p:spPr>
+          <a:xfrm>
+            <a:off x="8033522" y="3803125"/>
+            <a:ext cx="397866" cy="276999"/>
+          </a:xfrm>
+          <a:prstGeom prst="rect">
+            <a:avLst/>
+          </a:prstGeom>
+          <a:noFill/>
+        </p:spPr>
+        <p:txBody>
+          <a:bodyPr wrap="none" rtlCol="0">
+            <a:spAutoFit/>
+          </a:bodyPr>
+          <a:lstStyle/>
+          <a:p>
+            <a:r>
+              <a:rPr lang="es-MX" sz="1200" dirty="0">
+                <a:latin typeface="Arial" panose="020B0604020202020204" pitchFamily="34" charset="0"/>
+                <a:cs typeface="Arial" panose="020B0604020202020204" pitchFamily="34" charset="0"/>
+              </a:rPr>
+              <a:t>M2</a:t>
+            </a:r>
+          </a:p>
+        </p:txBody>
+      </p:sp>
+      <p:cxnSp>
+        <p:nvCxnSpPr>
+          <p:cNvPr id="17" name="19 Conector recto">
+            <a:extLst>
+              <a:ext uri="{FF2B5EF4-FFF2-40B4-BE49-F238E27FC236}">
+                <a16:creationId xmlns:a16="http://schemas.microsoft.com/office/drawing/2014/main" id="{741E6CB5-A68B-A8D0-7E7F-E475924E426E}"/>
+              </a:ext>
+            </a:extLst>
+          </p:cNvPr>
+          <p:cNvCxnSpPr/>
+          <p:nvPr/>
+        </p:nvCxnSpPr>
+        <p:spPr>
+          <a:xfrm>
+            <a:off x="7925370" y="4067970"/>
+            <a:ext cx="588134" cy="2"/>
+          </a:xfrm>
+          <a:prstGeom prst="line">
+            <a:avLst/>
+          </a:prstGeom>
+          <a:solidFill>
+            <a:schemeClr val="bg1"/>
+          </a:solidFill>
+          <a:ln w="12700" cap="flat">
+            <a:solidFill>
+              <a:schemeClr val="tx1"/>
+            </a:solidFill>
+            <a:headEnd type="oval" w="sm" len="sm"/>
+            <a:tailEnd type="oval" w="sm" len="sm"/>
+          </a:ln>
+        </p:spPr>
+        <p:style>
+          <a:lnRef idx="2">
+            <a:schemeClr val="accent1">
+              <a:shade val="50000"/>
+            </a:schemeClr>
+          </a:lnRef>
+          <a:fillRef idx="1">
+            <a:schemeClr val="accent1"/>
+          </a:fillRef>
+          <a:effectRef idx="0">
+            <a:schemeClr val="accent1"/>
+          </a:effectRef>
+          <a:fontRef idx="minor">
+            <a:schemeClr val="lt1"/>
+          </a:fontRef>
+        </p:style>
+      </p:cxnSp>
+      <p:sp>
+        <p:nvSpPr>
+          <p:cNvPr id="18" name="13 CuadroTexto">
+            <a:extLst>
+              <a:ext uri="{FF2B5EF4-FFF2-40B4-BE49-F238E27FC236}">
+                <a16:creationId xmlns:a16="http://schemas.microsoft.com/office/drawing/2014/main" id="{288C567A-2B18-25CE-E4FD-345C509A0A0E}"/>
+              </a:ext>
+            </a:extLst>
+          </p:cNvPr>
+          <p:cNvSpPr txBox="1"/>
+          <p:nvPr/>
+        </p:nvSpPr>
+        <p:spPr>
+          <a:xfrm>
+            <a:off x="8031671" y="4625828"/>
+            <a:ext cx="397866" cy="461665"/>
+          </a:xfrm>
+          <a:prstGeom prst="rect">
+            <a:avLst/>
+          </a:prstGeom>
+          <a:noFill/>
+        </p:spPr>
+        <p:txBody>
+          <a:bodyPr wrap="none" rtlCol="0">
+            <a:spAutoFit/>
+          </a:bodyPr>
+          <a:lstStyle/>
+          <a:p>
+            <a:r>
+              <a:rPr lang="es-MX" sz="1200" dirty="0">
+                <a:latin typeface="Arial" panose="020B0604020202020204" pitchFamily="34" charset="0"/>
+                <a:cs typeface="Arial" panose="020B0604020202020204" pitchFamily="34" charset="0"/>
+              </a:rPr>
+              <a:t>M3</a:t>
+            </a:r>
+          </a:p>
+          <a:p>
+            <a:endParaRPr lang="es-CO" sz="1200" dirty="0">
+              <a:latin typeface="Arial" panose="020B0604020202020204" pitchFamily="34" charset="0"/>
+              <a:cs typeface="Arial" panose="020B0604020202020204" pitchFamily="34" charset="0"/>
+            </a:endParaRPr>
+          </a:p>
+        </p:txBody>
+      </p:sp>
+      <p:cxnSp>
+        <p:nvCxnSpPr>
+          <p:cNvPr id="19" name="19 Conector recto">
+            <a:extLst>
+              <a:ext uri="{FF2B5EF4-FFF2-40B4-BE49-F238E27FC236}">
+                <a16:creationId xmlns:a16="http://schemas.microsoft.com/office/drawing/2014/main" id="{CA116150-F8A2-6506-AB66-872F1AF5EA2A}"/>
+              </a:ext>
+            </a:extLst>
+          </p:cNvPr>
+          <p:cNvCxnSpPr/>
+          <p:nvPr/>
+        </p:nvCxnSpPr>
+        <p:spPr>
+          <a:xfrm>
+            <a:off x="7918271" y="4868126"/>
+            <a:ext cx="588134" cy="2"/>
+          </a:xfrm>
+          <a:prstGeom prst="line">
+            <a:avLst/>
+          </a:prstGeom>
+          <a:solidFill>
+            <a:schemeClr val="bg1"/>
+          </a:solidFill>
+          <a:ln w="12700" cap="flat">
+            <a:solidFill>
+              <a:schemeClr val="tx1"/>
+            </a:solidFill>
+            <a:headEnd type="oval" w="sm" len="sm"/>
+            <a:tailEnd type="oval" w="sm" len="sm"/>
+          </a:ln>
+        </p:spPr>
+        <p:style>
+          <a:lnRef idx="2">
+            <a:schemeClr val="accent1">
+              <a:shade val="50000"/>
+            </a:schemeClr>
+          </a:lnRef>
+          <a:fillRef idx="1">
+            <a:schemeClr val="accent1"/>
+          </a:fillRef>
+          <a:effectRef idx="0">
+            <a:schemeClr val="accent1"/>
+          </a:effectRef>
+          <a:fontRef idx="minor">
+            <a:schemeClr val="lt1"/>
+          </a:fontRef>
+        </p:style>
+      </p:cxnSp>
     </p:spTree>
     <p:extLst>
       <p:ext uri="{BB962C8B-B14F-4D97-AF65-F5344CB8AC3E}">

</xml_diff>